<commit_message>
Worked on presentation some
</commit_message>
<xml_diff>
--- a/Presentation/Presentation1.pptx
+++ b/Presentation/Presentation1.pptx
@@ -5,10 +5,12 @@
     <p:sldMasterId id="2147483672" r:id="rId1"/>
   </p:sldMasterIdLst>
   <p:sldIdLst>
-    <p:sldId id="256" r:id="rId2"/>
-    <p:sldId id="258" r:id="rId3"/>
-    <p:sldId id="257" r:id="rId4"/>
-    <p:sldId id="259" r:id="rId5"/>
+    <p:sldId id="265" r:id="rId2"/>
+    <p:sldId id="259" r:id="rId3"/>
+    <p:sldId id="260" r:id="rId4"/>
+    <p:sldId id="262" r:id="rId5"/>
+    <p:sldId id="263" r:id="rId6"/>
+    <p:sldId id="264" r:id="rId7"/>
   </p:sldIdLst>
   <p:sldSz cx="12192000" cy="6858000"/>
   <p:notesSz cx="6858000" cy="9144000"/>
@@ -241,7 +243,7 @@
           <a:p>
             <a:fld id="{0B8430BB-8CC7-4E7F-82F5-C82E7BC73041}" type="datetimeFigureOut">
               <a:rPr lang="en-US" smtClean="0"/>
-              <a:t>10/1/2015</a:t>
+              <a:t>10/5/2015</a:t>
             </a:fld>
             <a:endParaRPr lang="en-US"/>
           </a:p>
@@ -411,7 +413,7 @@
           <a:p>
             <a:fld id="{0B8430BB-8CC7-4E7F-82F5-C82E7BC73041}" type="datetimeFigureOut">
               <a:rPr lang="en-US" smtClean="0"/>
-              <a:t>10/1/2015</a:t>
+              <a:t>10/5/2015</a:t>
             </a:fld>
             <a:endParaRPr lang="en-US"/>
           </a:p>
@@ -591,7 +593,7 @@
           <a:p>
             <a:fld id="{0B8430BB-8CC7-4E7F-82F5-C82E7BC73041}" type="datetimeFigureOut">
               <a:rPr lang="en-US" smtClean="0"/>
-              <a:t>10/1/2015</a:t>
+              <a:t>10/5/2015</a:t>
             </a:fld>
             <a:endParaRPr lang="en-US"/>
           </a:p>
@@ -761,7 +763,7 @@
           <a:p>
             <a:fld id="{0B8430BB-8CC7-4E7F-82F5-C82E7BC73041}" type="datetimeFigureOut">
               <a:rPr lang="en-US" smtClean="0"/>
-              <a:t>10/1/2015</a:t>
+              <a:t>10/5/2015</a:t>
             </a:fld>
             <a:endParaRPr lang="en-US"/>
           </a:p>
@@ -1007,7 +1009,7 @@
           <a:p>
             <a:fld id="{0B8430BB-8CC7-4E7F-82F5-C82E7BC73041}" type="datetimeFigureOut">
               <a:rPr lang="en-US" smtClean="0"/>
-              <a:t>10/1/2015</a:t>
+              <a:t>10/5/2015</a:t>
             </a:fld>
             <a:endParaRPr lang="en-US"/>
           </a:p>
@@ -1239,7 +1241,7 @@
           <a:p>
             <a:fld id="{0B8430BB-8CC7-4E7F-82F5-C82E7BC73041}" type="datetimeFigureOut">
               <a:rPr lang="en-US" smtClean="0"/>
-              <a:t>10/1/2015</a:t>
+              <a:t>10/5/2015</a:t>
             </a:fld>
             <a:endParaRPr lang="en-US"/>
           </a:p>
@@ -1606,7 +1608,7 @@
           <a:p>
             <a:fld id="{0B8430BB-8CC7-4E7F-82F5-C82E7BC73041}" type="datetimeFigureOut">
               <a:rPr lang="en-US" smtClean="0"/>
-              <a:t>10/1/2015</a:t>
+              <a:t>10/5/2015</a:t>
             </a:fld>
             <a:endParaRPr lang="en-US"/>
           </a:p>
@@ -1724,7 +1726,7 @@
           <a:p>
             <a:fld id="{0B8430BB-8CC7-4E7F-82F5-C82E7BC73041}" type="datetimeFigureOut">
               <a:rPr lang="en-US" smtClean="0"/>
-              <a:t>10/1/2015</a:t>
+              <a:t>10/5/2015</a:t>
             </a:fld>
             <a:endParaRPr lang="en-US"/>
           </a:p>
@@ -1819,7 +1821,7 @@
           <a:p>
             <a:fld id="{0B8430BB-8CC7-4E7F-82F5-C82E7BC73041}" type="datetimeFigureOut">
               <a:rPr lang="en-US" smtClean="0"/>
-              <a:t>10/1/2015</a:t>
+              <a:t>10/5/2015</a:t>
             </a:fld>
             <a:endParaRPr lang="en-US"/>
           </a:p>
@@ -2096,7 +2098,7 @@
           <a:p>
             <a:fld id="{0B8430BB-8CC7-4E7F-82F5-C82E7BC73041}" type="datetimeFigureOut">
               <a:rPr lang="en-US" smtClean="0"/>
-              <a:t>10/1/2015</a:t>
+              <a:t>10/5/2015</a:t>
             </a:fld>
             <a:endParaRPr lang="en-US"/>
           </a:p>
@@ -2353,7 +2355,7 @@
           <a:p>
             <a:fld id="{0B8430BB-8CC7-4E7F-82F5-C82E7BC73041}" type="datetimeFigureOut">
               <a:rPr lang="en-US" smtClean="0"/>
-              <a:t>10/1/2015</a:t>
+              <a:t>10/5/2015</a:t>
             </a:fld>
             <a:endParaRPr lang="en-US"/>
           </a:p>
@@ -2566,7 +2568,7 @@
           <a:p>
             <a:fld id="{0B8430BB-8CC7-4E7F-82F5-C82E7BC73041}" type="datetimeFigureOut">
               <a:rPr lang="en-US" smtClean="0"/>
-              <a:t>10/1/2015</a:t>
+              <a:t>10/5/2015</a:t>
             </a:fld>
             <a:endParaRPr lang="en-US"/>
           </a:p>
@@ -2974,13 +2976,20 @@
     </p:spTree>
     <p:extLst>
       <p:ext uri="{BB962C8B-B14F-4D97-AF65-F5344CB8AC3E}">
-        <p14:creationId xmlns:p14="http://schemas.microsoft.com/office/powerpoint/2010/main" val="2787355243"/>
+        <p14:creationId xmlns:p14="http://schemas.microsoft.com/office/powerpoint/2010/main" val="2283121087"/>
       </p:ext>
     </p:extLst>
   </p:cSld>
   <p:clrMapOvr>
     <a:masterClrMapping/>
   </p:clrMapOvr>
+  <p:timing>
+    <p:tnLst>
+      <p:par>
+        <p:cTn id="1" dur="indefinite" restart="never" nodeType="tmRoot"/>
+      </p:par>
+    </p:tnLst>
+  </p:timing>
 </p:sld>
 </file>
 
@@ -3001,45 +3010,66 @@
           <a:chExt cx="0" cy="0"/>
         </a:xfrm>
       </p:grpSpPr>
-      <p:pic>
-        <p:nvPicPr>
-          <p:cNvPr id="4" name="Content Placeholder 3"/>
-          <p:cNvPicPr>
-            <a:picLocks noGrp="1" noChangeAspect="1"/>
-          </p:cNvPicPr>
-          <p:nvPr>
-            <p:ph idx="1"/>
-          </p:nvPr>
-        </p:nvPicPr>
-        <p:blipFill>
-          <a:blip r:embed="rId2">
-            <a:extLst>
-              <a:ext uri="{28A0092B-C50C-407E-A947-70E740481C1C}">
-                <a14:useLocalDpi xmlns:a14="http://schemas.microsoft.com/office/drawing/2010/main" val="0"/>
-              </a:ext>
-            </a:extLst>
-          </a:blip>
-          <a:stretch>
-            <a:fillRect/>
-          </a:stretch>
-        </p:blipFill>
+      <p:sp>
+        <p:nvSpPr>
+          <p:cNvPr id="2" name="Title 1"/>
+          <p:cNvSpPr>
+            <a:spLocks noGrp="1"/>
+          </p:cNvSpPr>
+          <p:nvPr>
+            <p:ph type="title"/>
+          </p:nvPr>
+        </p:nvSpPr>
         <p:spPr>
           <a:xfrm>
-            <a:off x="1629032" y="340411"/>
-            <a:ext cx="9203724" cy="6231989"/>
+            <a:off x="838200" y="2766219"/>
+            <a:ext cx="10515600" cy="1325563"/>
           </a:xfrm>
         </p:spPr>
-      </p:pic>
+        <p:txBody>
+          <a:bodyPr>
+            <a:normAutofit/>
+          </a:bodyPr>
+          <a:lstStyle/>
+          <a:p>
+            <a:pPr algn="ctr"/>
+            <a:r>
+              <a:rPr lang="en-US" sz="7200" dirty="0" smtClean="0"/>
+              <a:t>The Creaking Grounds</a:t>
+            </a:r>
+            <a:endParaRPr lang="en-US" sz="7200" dirty="0"/>
+          </a:p>
+        </p:txBody>
+      </p:sp>
     </p:spTree>
     <p:extLst>
       <p:ext uri="{BB962C8B-B14F-4D97-AF65-F5344CB8AC3E}">
-        <p14:creationId xmlns:p14="http://schemas.microsoft.com/office/powerpoint/2010/main" val="1517012699"/>
+        <p14:creationId xmlns:p14="http://schemas.microsoft.com/office/powerpoint/2010/main" val="47318644"/>
       </p:ext>
     </p:extLst>
   </p:cSld>
   <p:clrMapOvr>
     <a:masterClrMapping/>
   </p:clrMapOvr>
+  <mc:AlternateContent xmlns:mc="http://schemas.openxmlformats.org/markup-compatibility/2006" xmlns:p14="http://schemas.microsoft.com/office/powerpoint/2010/main">
+    <mc:Choice Requires="p14">
+      <p:transition spd="med" p14:dur="700">
+        <p:fade/>
+      </p:transition>
+    </mc:Choice>
+    <mc:Fallback xmlns="">
+      <p:transition spd="med">
+        <p:fade/>
+      </p:transition>
+    </mc:Fallback>
+  </mc:AlternateContent>
+  <p:timing>
+    <p:tnLst>
+      <p:par>
+        <p:cTn id="1" dur="indefinite" restart="never" nodeType="tmRoot"/>
+      </p:par>
+    </p:tnLst>
+  </p:timing>
 </p:sld>
 </file>
 
@@ -3060,16 +3090,64 @@
           <a:chExt cx="0" cy="0"/>
         </a:xfrm>
       </p:grpSpPr>
+      <p:sp>
+        <p:nvSpPr>
+          <p:cNvPr id="2" name="Title 1"/>
+          <p:cNvSpPr>
+            <a:spLocks noGrp="1"/>
+          </p:cNvSpPr>
+          <p:nvPr>
+            <p:ph type="title"/>
+          </p:nvPr>
+        </p:nvSpPr>
+        <p:spPr/>
+        <p:txBody>
+          <a:bodyPr/>
+          <a:lstStyle/>
+          <a:p>
+            <a:r>
+              <a:rPr lang="en-US" dirty="0" smtClean="0"/>
+              <a:t>Razor Statement</a:t>
+            </a:r>
+            <a:endParaRPr lang="en-US" dirty="0"/>
+          </a:p>
+        </p:txBody>
+      </p:sp>
+      <p:sp>
+        <p:nvSpPr>
+          <p:cNvPr id="3" name="Content Placeholder 2"/>
+          <p:cNvSpPr>
+            <a:spLocks noGrp="1"/>
+          </p:cNvSpPr>
+          <p:nvPr>
+            <p:ph idx="1"/>
+          </p:nvPr>
+        </p:nvSpPr>
+        <p:spPr/>
+        <p:txBody>
+          <a:bodyPr/>
+          <a:lstStyle/>
+          <a:p>
+            <a:pPr marL="0" indent="0" algn="ctr">
+              <a:buNone/>
+            </a:pPr>
+            <a:r>
+              <a:rPr lang="en-US" dirty="0"/>
+              <a:t>Explore the old mansion collecting items to survive. But beware the cursed spirits of this house for they have surprises of their own waiting.</a:t>
+            </a:r>
+          </a:p>
+        </p:txBody>
+      </p:sp>
       <p:pic>
         <p:nvPicPr>
-          <p:cNvPr id="5" name="Picture 4"/>
+          <p:cNvPr id="4" name="Content Placeholder 3"/>
           <p:cNvPicPr>
             <a:picLocks noChangeAspect="1"/>
           </p:cNvPicPr>
           <p:nvPr/>
         </p:nvPicPr>
         <p:blipFill>
-          <a:blip r:embed="rId2" cstate="print">
+          <a:blip r:embed="rId2">
             <a:extLst>
               <a:ext uri="{28A0092B-C50C-407E-A947-70E740481C1C}">
                 <a14:useLocalDpi xmlns:a14="http://schemas.microsoft.com/office/drawing/2010/main" val="0"/>
@@ -3082,8 +3160,8 @@
         </p:blipFill>
         <p:spPr>
           <a:xfrm>
-            <a:off x="1688756" y="270912"/>
-            <a:ext cx="8660799" cy="6298763"/>
+            <a:off x="2800348" y="2766591"/>
+            <a:ext cx="5845630" cy="3958170"/>
           </a:xfrm>
           <a:prstGeom prst="rect">
             <a:avLst/>
@@ -3093,13 +3171,20 @@
     </p:spTree>
     <p:extLst>
       <p:ext uri="{BB962C8B-B14F-4D97-AF65-F5344CB8AC3E}">
-        <p14:creationId xmlns:p14="http://schemas.microsoft.com/office/powerpoint/2010/main" val="1830172215"/>
+        <p14:creationId xmlns:p14="http://schemas.microsoft.com/office/powerpoint/2010/main" val="2582195963"/>
       </p:ext>
     </p:extLst>
   </p:cSld>
   <p:clrMapOvr>
     <a:masterClrMapping/>
   </p:clrMapOvr>
+  <p:timing>
+    <p:tnLst>
+      <p:par>
+        <p:cTn id="1" dur="indefinite" restart="never" nodeType="tmRoot"/>
+      </p:par>
+    </p:tnLst>
+  </p:timing>
 </p:sld>
 </file>
 
@@ -3120,100 +3205,210 @@
           <a:chExt cx="0" cy="0"/>
         </a:xfrm>
       </p:grpSpPr>
-      <p:pic>
-        <p:nvPicPr>
-          <p:cNvPr id="4" name="Picture 3"/>
-          <p:cNvPicPr>
-            <a:picLocks noChangeAspect="1"/>
-          </p:cNvPicPr>
-          <p:nvPr/>
-        </p:nvPicPr>
-        <p:blipFill>
-          <a:blip r:embed="rId2">
-            <a:extLst>
-              <a:ext uri="{28A0092B-C50C-407E-A947-70E740481C1C}">
-                <a14:useLocalDpi xmlns:a14="http://schemas.microsoft.com/office/drawing/2010/main" val="0"/>
-              </a:ext>
-            </a:extLst>
-          </a:blip>
-          <a:stretch>
-            <a:fillRect/>
-          </a:stretch>
-        </p:blipFill>
-        <p:spPr>
-          <a:xfrm>
-            <a:off x="551934" y="387823"/>
-            <a:ext cx="3518795" cy="3602080"/>
-          </a:xfrm>
-          <a:prstGeom prst="rect">
-            <a:avLst/>
-          </a:prstGeom>
-        </p:spPr>
-      </p:pic>
-      <p:pic>
-        <p:nvPicPr>
-          <p:cNvPr id="5" name="Picture 4"/>
-          <p:cNvPicPr>
-            <a:picLocks noChangeAspect="1"/>
-          </p:cNvPicPr>
-          <p:nvPr/>
-        </p:nvPicPr>
-        <p:blipFill>
-          <a:blip r:embed="rId3">
-            <a:extLst>
-              <a:ext uri="{28A0092B-C50C-407E-A947-70E740481C1C}">
-                <a14:useLocalDpi xmlns:a14="http://schemas.microsoft.com/office/drawing/2010/main" val="0"/>
-              </a:ext>
-            </a:extLst>
-          </a:blip>
-          <a:stretch>
-            <a:fillRect/>
-          </a:stretch>
-        </p:blipFill>
-        <p:spPr>
-          <a:xfrm>
-            <a:off x="4135393" y="2503580"/>
-            <a:ext cx="3633981" cy="3887515"/>
-          </a:xfrm>
-          <a:prstGeom prst="rect">
-            <a:avLst/>
-          </a:prstGeom>
-        </p:spPr>
-      </p:pic>
-      <p:pic>
-        <p:nvPicPr>
-          <p:cNvPr id="6" name="Picture 5"/>
-          <p:cNvPicPr>
-            <a:picLocks noChangeAspect="1"/>
-          </p:cNvPicPr>
-          <p:nvPr/>
-        </p:nvPicPr>
-        <p:blipFill>
-          <a:blip r:embed="rId4">
-            <a:extLst>
-              <a:ext uri="{28A0092B-C50C-407E-A947-70E740481C1C}">
-                <a14:useLocalDpi xmlns:a14="http://schemas.microsoft.com/office/drawing/2010/main" val="0"/>
-              </a:ext>
-            </a:extLst>
-          </a:blip>
-          <a:stretch>
-            <a:fillRect/>
-          </a:stretch>
-        </p:blipFill>
-        <p:spPr>
-          <a:xfrm>
-            <a:off x="7834038" y="387823"/>
-            <a:ext cx="4020423" cy="3656505"/>
-          </a:xfrm>
-          <a:prstGeom prst="rect">
-            <a:avLst/>
-          </a:prstGeom>
-        </p:spPr>
-      </p:pic>
+      <p:sp>
+        <p:nvSpPr>
+          <p:cNvPr id="2" name="Title 1"/>
+          <p:cNvSpPr>
+            <a:spLocks noGrp="1"/>
+          </p:cNvSpPr>
+          <p:nvPr>
+            <p:ph type="title"/>
+          </p:nvPr>
+        </p:nvSpPr>
+        <p:spPr/>
+        <p:txBody>
+          <a:bodyPr/>
+          <a:lstStyle/>
+          <a:p>
+            <a:r>
+              <a:rPr lang="en-US" dirty="0" smtClean="0"/>
+              <a:t>User Stories</a:t>
+            </a:r>
+            <a:endParaRPr lang="en-US" dirty="0"/>
+          </a:p>
+        </p:txBody>
+      </p:sp>
+      <p:sp>
+        <p:nvSpPr>
+          <p:cNvPr id="3" name="Content Placeholder 2"/>
+          <p:cNvSpPr>
+            <a:spLocks noGrp="1"/>
+          </p:cNvSpPr>
+          <p:nvPr>
+            <p:ph idx="1"/>
+          </p:nvPr>
+        </p:nvSpPr>
+        <p:spPr/>
+        <p:txBody>
+          <a:bodyPr/>
+          <a:lstStyle/>
+          <a:p>
+            <a:endParaRPr lang="en-US"/>
+          </a:p>
+        </p:txBody>
+      </p:sp>
     </p:spTree>
     <p:extLst>
       <p:ext uri="{BB962C8B-B14F-4D97-AF65-F5344CB8AC3E}">
-        <p14:creationId xmlns:p14="http://schemas.microsoft.com/office/powerpoint/2010/main" val="2184402810"/>
+        <p14:creationId xmlns:p14="http://schemas.microsoft.com/office/powerpoint/2010/main" val="805195606"/>
+      </p:ext>
+    </p:extLst>
+  </p:cSld>
+  <p:clrMapOvr>
+    <a:masterClrMapping/>
+  </p:clrMapOvr>
+  <p:timing>
+    <p:tnLst>
+      <p:par>
+        <p:cTn id="1" dur="indefinite" restart="never" nodeType="tmRoot"/>
+      </p:par>
+    </p:tnLst>
+  </p:timing>
+</p:sld>
+</file>
+
+<file path=ppt/slides/slide5.xml><?xml version="1.0" encoding="utf-8"?>
+<p:sld xmlns:a="http://schemas.openxmlformats.org/drawingml/2006/main" xmlns:r="http://schemas.openxmlformats.org/officeDocument/2006/relationships" xmlns:p="http://schemas.openxmlformats.org/presentationml/2006/main">
+  <p:cSld>
+    <p:spTree>
+      <p:nvGrpSpPr>
+        <p:cNvPr id="1" name=""/>
+        <p:cNvGrpSpPr/>
+        <p:nvPr/>
+      </p:nvGrpSpPr>
+      <p:grpSpPr>
+        <a:xfrm>
+          <a:off x="0" y="0"/>
+          <a:ext cx="0" cy="0"/>
+          <a:chOff x="0" y="0"/>
+          <a:chExt cx="0" cy="0"/>
+        </a:xfrm>
+      </p:grpSpPr>
+      <p:sp>
+        <p:nvSpPr>
+          <p:cNvPr id="2" name="Title 1"/>
+          <p:cNvSpPr>
+            <a:spLocks noGrp="1"/>
+          </p:cNvSpPr>
+          <p:nvPr>
+            <p:ph type="title"/>
+          </p:nvPr>
+        </p:nvSpPr>
+        <p:spPr/>
+        <p:txBody>
+          <a:bodyPr/>
+          <a:lstStyle/>
+          <a:p>
+            <a:r>
+              <a:rPr lang="en-US" dirty="0" smtClean="0"/>
+              <a:t>Game Features</a:t>
+            </a:r>
+            <a:endParaRPr lang="en-US" dirty="0"/>
+          </a:p>
+        </p:txBody>
+      </p:sp>
+      <p:sp>
+        <p:nvSpPr>
+          <p:cNvPr id="3" name="Content Placeholder 2"/>
+          <p:cNvSpPr>
+            <a:spLocks noGrp="1"/>
+          </p:cNvSpPr>
+          <p:nvPr>
+            <p:ph idx="1"/>
+          </p:nvPr>
+        </p:nvSpPr>
+        <p:spPr/>
+        <p:txBody>
+          <a:bodyPr/>
+          <a:lstStyle/>
+          <a:p>
+            <a:endParaRPr lang="en-US"/>
+          </a:p>
+        </p:txBody>
+      </p:sp>
+    </p:spTree>
+    <p:extLst>
+      <p:ext uri="{BB962C8B-B14F-4D97-AF65-F5344CB8AC3E}">
+        <p14:creationId xmlns:p14="http://schemas.microsoft.com/office/powerpoint/2010/main" val="362798058"/>
+      </p:ext>
+    </p:extLst>
+  </p:cSld>
+  <p:clrMapOvr>
+    <a:masterClrMapping/>
+  </p:clrMapOvr>
+  <p:timing>
+    <p:tnLst>
+      <p:par>
+        <p:cTn id="1" dur="indefinite" restart="never" nodeType="tmRoot"/>
+      </p:par>
+    </p:tnLst>
+  </p:timing>
+</p:sld>
+</file>
+
+<file path=ppt/slides/slide6.xml><?xml version="1.0" encoding="utf-8"?>
+<p:sld xmlns:a="http://schemas.openxmlformats.org/drawingml/2006/main" xmlns:r="http://schemas.openxmlformats.org/officeDocument/2006/relationships" xmlns:p="http://schemas.openxmlformats.org/presentationml/2006/main">
+  <p:cSld>
+    <p:spTree>
+      <p:nvGrpSpPr>
+        <p:cNvPr id="1" name=""/>
+        <p:cNvGrpSpPr/>
+        <p:nvPr/>
+      </p:nvGrpSpPr>
+      <p:grpSpPr>
+        <a:xfrm>
+          <a:off x="0" y="0"/>
+          <a:ext cx="0" cy="0"/>
+          <a:chOff x="0" y="0"/>
+          <a:chExt cx="0" cy="0"/>
+        </a:xfrm>
+      </p:grpSpPr>
+      <p:sp>
+        <p:nvSpPr>
+          <p:cNvPr id="2" name="Title 1"/>
+          <p:cNvSpPr>
+            <a:spLocks noGrp="1"/>
+          </p:cNvSpPr>
+          <p:nvPr>
+            <p:ph type="title"/>
+          </p:nvPr>
+        </p:nvSpPr>
+        <p:spPr/>
+        <p:txBody>
+          <a:bodyPr/>
+          <a:lstStyle/>
+          <a:p>
+            <a:r>
+              <a:rPr lang="en-US" dirty="0" smtClean="0"/>
+              <a:t>Demo</a:t>
+            </a:r>
+            <a:endParaRPr lang="en-US" dirty="0"/>
+          </a:p>
+        </p:txBody>
+      </p:sp>
+      <p:sp>
+        <p:nvSpPr>
+          <p:cNvPr id="3" name="Content Placeholder 2"/>
+          <p:cNvSpPr>
+            <a:spLocks noGrp="1"/>
+          </p:cNvSpPr>
+          <p:nvPr>
+            <p:ph idx="1"/>
+          </p:nvPr>
+        </p:nvSpPr>
+        <p:spPr/>
+        <p:txBody>
+          <a:bodyPr/>
+          <a:lstStyle/>
+          <a:p>
+            <a:endParaRPr lang="en-US"/>
+          </a:p>
+        </p:txBody>
+      </p:sp>
+    </p:spTree>
+    <p:extLst>
+      <p:ext uri="{BB962C8B-B14F-4D97-AF65-F5344CB8AC3E}">
+        <p14:creationId xmlns:p14="http://schemas.microsoft.com/office/powerpoint/2010/main" val="3761467373"/>
       </p:ext>
     </p:extLst>
   </p:cSld>
@@ -3478,7 +3673,7 @@
   <a:extraClrSchemeLst/>
   <a:extLst>
     <a:ext uri="{05A4C25C-085E-4340-85A3-A5531E510DB2}">
-      <thm15:themeFamily xmlns:thm15="http://schemas.microsoft.com/office/thememl/2012/main" name="Office Theme" id="{62F939B6-93AF-4DB8-9C6B-D6C7DFDC589F}" vid="{3E4F19A7-A959-40BB-972C-4880BAF8EB09}"/>
+      <thm15:themeFamily xmlns="" xmlns:thm15="http://schemas.microsoft.com/office/thememl/2012/main" name="Office Theme" id="{62F939B6-93AF-4DB8-9C6B-D6C7DFDC589F}" vid="{3E4F19A7-A959-40BB-972C-4880BAF8EB09}"/>
     </a:ext>
   </a:extLst>
 </a:theme>

</xml_diff>

<commit_message>
Finish of Presentation powerpoint and script! Added Round Description to Documents folder.
</commit_message>
<xml_diff>
--- a/Presentation/Presentation1.pptx
+++ b/Presentation/Presentation1.pptx
@@ -10,7 +10,10 @@
     <p:sldId id="260" r:id="rId4"/>
     <p:sldId id="262" r:id="rId5"/>
     <p:sldId id="263" r:id="rId6"/>
-    <p:sldId id="264" r:id="rId7"/>
+    <p:sldId id="266" r:id="rId7"/>
+    <p:sldId id="264" r:id="rId8"/>
+    <p:sldId id="267" r:id="rId9"/>
+    <p:sldId id="268" r:id="rId10"/>
   </p:sldIdLst>
   <p:sldSz cx="12192000" cy="6858000"/>
   <p:notesSz cx="6858000" cy="9144000"/>
@@ -3240,10 +3243,59 @@
         </p:nvSpPr>
         <p:spPr/>
         <p:txBody>
-          <a:bodyPr/>
-          <a:lstStyle/>
-          <a:p>
-            <a:endParaRPr lang="en-US"/>
+          <a:bodyPr>
+            <a:normAutofit lnSpcReduction="10000"/>
+          </a:bodyPr>
+          <a:lstStyle/>
+          <a:p>
+            <a:r>
+              <a:rPr lang="en-US" dirty="0" smtClean="0"/>
+              <a:t>As a player I want to search rooms in order to find items to help me survive</a:t>
+            </a:r>
+          </a:p>
+          <a:p>
+            <a:r>
+              <a:rPr lang="en-US" dirty="0" smtClean="0"/>
+              <a:t>As </a:t>
+            </a:r>
+            <a:r>
+              <a:rPr lang="en-US" dirty="0"/>
+              <a:t>a player I want to explore the mansion in order to find more </a:t>
+            </a:r>
+            <a:r>
+              <a:rPr lang="en-US" dirty="0" smtClean="0"/>
+              <a:t>equipment</a:t>
+            </a:r>
+          </a:p>
+          <a:p>
+            <a:r>
+              <a:rPr lang="en-US" dirty="0"/>
+              <a:t>As a player I want to customize my character and select abilities that suit my play style</a:t>
+            </a:r>
+            <a:r>
+              <a:rPr lang="en-US" dirty="0" smtClean="0"/>
+              <a:t>.</a:t>
+            </a:r>
+          </a:p>
+          <a:p>
+            <a:r>
+              <a:rPr lang="en-US" dirty="0"/>
+              <a:t>As a Betrayer I want to be able to attack the players in different ways in order to win the game</a:t>
+            </a:r>
+            <a:r>
+              <a:rPr lang="en-US" dirty="0" smtClean="0"/>
+              <a:t>.</a:t>
+            </a:r>
+          </a:p>
+          <a:p>
+            <a:r>
+              <a:rPr lang="en-US" dirty="0"/>
+              <a:t>As a Player, I want to be able to complete various objectives in order to defeat the betrayer and win the game</a:t>
+            </a:r>
+            <a:r>
+              <a:rPr lang="en-US" dirty="0" smtClean="0"/>
+              <a:t>.</a:t>
+            </a:r>
           </a:p>
         </p:txBody>
       </p:sp>
@@ -3260,7 +3312,335 @@
   <p:timing>
     <p:tnLst>
       <p:par>
-        <p:cTn id="1" dur="indefinite" restart="never" nodeType="tmRoot"/>
+        <p:cTn id="1" dur="indefinite" restart="never" nodeType="tmRoot">
+          <p:childTnLst>
+            <p:seq concurrent="1" nextAc="seek">
+              <p:cTn id="2" dur="indefinite" nodeType="mainSeq">
+                <p:childTnLst>
+                  <p:par>
+                    <p:cTn id="3" fill="hold">
+                      <p:stCondLst>
+                        <p:cond delay="indefinite"/>
+                      </p:stCondLst>
+                      <p:childTnLst>
+                        <p:par>
+                          <p:cTn id="4" fill="hold">
+                            <p:stCondLst>
+                              <p:cond delay="0"/>
+                            </p:stCondLst>
+                            <p:childTnLst>
+                              <p:par>
+                                <p:cTn id="5" presetID="10" presetClass="entr" presetSubtype="0" fill="hold" nodeType="clickEffect">
+                                  <p:stCondLst>
+                                    <p:cond delay="0"/>
+                                  </p:stCondLst>
+                                  <p:childTnLst>
+                                    <p:set>
+                                      <p:cBhvr>
+                                        <p:cTn id="6" dur="1" fill="hold">
+                                          <p:stCondLst>
+                                            <p:cond delay="0"/>
+                                          </p:stCondLst>
+                                        </p:cTn>
+                                        <p:tgtEl>
+                                          <p:spTgt spid="3">
+                                            <p:txEl>
+                                              <p:pRg st="0" end="0"/>
+                                            </p:txEl>
+                                          </p:spTgt>
+                                        </p:tgtEl>
+                                        <p:attrNameLst>
+                                          <p:attrName>style.visibility</p:attrName>
+                                        </p:attrNameLst>
+                                      </p:cBhvr>
+                                      <p:to>
+                                        <p:strVal val="visible"/>
+                                      </p:to>
+                                    </p:set>
+                                    <p:animEffect transition="in" filter="fade">
+                                      <p:cBhvr>
+                                        <p:cTn id="7" dur="500"/>
+                                        <p:tgtEl>
+                                          <p:spTgt spid="3">
+                                            <p:txEl>
+                                              <p:pRg st="0" end="0"/>
+                                            </p:txEl>
+                                          </p:spTgt>
+                                        </p:tgtEl>
+                                      </p:cBhvr>
+                                    </p:animEffect>
+                                  </p:childTnLst>
+                                </p:cTn>
+                              </p:par>
+                            </p:childTnLst>
+                          </p:cTn>
+                        </p:par>
+                      </p:childTnLst>
+                    </p:cTn>
+                  </p:par>
+                  <p:par>
+                    <p:cTn id="8" fill="hold">
+                      <p:stCondLst>
+                        <p:cond delay="indefinite"/>
+                      </p:stCondLst>
+                      <p:childTnLst>
+                        <p:par>
+                          <p:cTn id="9" fill="hold">
+                            <p:stCondLst>
+                              <p:cond delay="0"/>
+                            </p:stCondLst>
+                            <p:childTnLst>
+                              <p:par>
+                                <p:cTn id="10" presetID="10" presetClass="entr" presetSubtype="0" fill="hold" nodeType="clickEffect">
+                                  <p:stCondLst>
+                                    <p:cond delay="0"/>
+                                  </p:stCondLst>
+                                  <p:childTnLst>
+                                    <p:set>
+                                      <p:cBhvr>
+                                        <p:cTn id="11" dur="1" fill="hold">
+                                          <p:stCondLst>
+                                            <p:cond delay="0"/>
+                                          </p:stCondLst>
+                                        </p:cTn>
+                                        <p:tgtEl>
+                                          <p:spTgt spid="3">
+                                            <p:txEl>
+                                              <p:pRg st="1" end="1"/>
+                                            </p:txEl>
+                                          </p:spTgt>
+                                        </p:tgtEl>
+                                        <p:attrNameLst>
+                                          <p:attrName>style.visibility</p:attrName>
+                                        </p:attrNameLst>
+                                      </p:cBhvr>
+                                      <p:to>
+                                        <p:strVal val="visible"/>
+                                      </p:to>
+                                    </p:set>
+                                    <p:animEffect transition="in" filter="fade">
+                                      <p:cBhvr>
+                                        <p:cTn id="12" dur="500"/>
+                                        <p:tgtEl>
+                                          <p:spTgt spid="3">
+                                            <p:txEl>
+                                              <p:pRg st="1" end="1"/>
+                                            </p:txEl>
+                                          </p:spTgt>
+                                        </p:tgtEl>
+                                      </p:cBhvr>
+                                    </p:animEffect>
+                                  </p:childTnLst>
+                                </p:cTn>
+                              </p:par>
+                            </p:childTnLst>
+                          </p:cTn>
+                        </p:par>
+                      </p:childTnLst>
+                    </p:cTn>
+                  </p:par>
+                  <p:par>
+                    <p:cTn id="13" fill="hold">
+                      <p:stCondLst>
+                        <p:cond delay="indefinite"/>
+                      </p:stCondLst>
+                      <p:childTnLst>
+                        <p:par>
+                          <p:cTn id="14" fill="hold">
+                            <p:stCondLst>
+                              <p:cond delay="0"/>
+                            </p:stCondLst>
+                            <p:childTnLst>
+                              <p:par>
+                                <p:cTn id="15" presetID="10" presetClass="entr" presetSubtype="0" fill="hold" nodeType="clickEffect">
+                                  <p:stCondLst>
+                                    <p:cond delay="0"/>
+                                  </p:stCondLst>
+                                  <p:childTnLst>
+                                    <p:set>
+                                      <p:cBhvr>
+                                        <p:cTn id="16" dur="1" fill="hold">
+                                          <p:stCondLst>
+                                            <p:cond delay="0"/>
+                                          </p:stCondLst>
+                                        </p:cTn>
+                                        <p:tgtEl>
+                                          <p:spTgt spid="3">
+                                            <p:txEl>
+                                              <p:pRg st="2" end="2"/>
+                                            </p:txEl>
+                                          </p:spTgt>
+                                        </p:tgtEl>
+                                        <p:attrNameLst>
+                                          <p:attrName>style.visibility</p:attrName>
+                                        </p:attrNameLst>
+                                      </p:cBhvr>
+                                      <p:to>
+                                        <p:strVal val="visible"/>
+                                      </p:to>
+                                    </p:set>
+                                    <p:animEffect transition="in" filter="fade">
+                                      <p:cBhvr>
+                                        <p:cTn id="17" dur="500"/>
+                                        <p:tgtEl>
+                                          <p:spTgt spid="3">
+                                            <p:txEl>
+                                              <p:pRg st="2" end="2"/>
+                                            </p:txEl>
+                                          </p:spTgt>
+                                        </p:tgtEl>
+                                      </p:cBhvr>
+                                    </p:animEffect>
+                                  </p:childTnLst>
+                                </p:cTn>
+                              </p:par>
+                            </p:childTnLst>
+                          </p:cTn>
+                        </p:par>
+                      </p:childTnLst>
+                    </p:cTn>
+                  </p:par>
+                  <p:par>
+                    <p:cTn id="18" fill="hold">
+                      <p:stCondLst>
+                        <p:cond delay="indefinite"/>
+                      </p:stCondLst>
+                      <p:childTnLst>
+                        <p:par>
+                          <p:cTn id="19" fill="hold">
+                            <p:stCondLst>
+                              <p:cond delay="0"/>
+                            </p:stCondLst>
+                            <p:childTnLst>
+                              <p:par>
+                                <p:cTn id="20" presetID="10" presetClass="entr" presetSubtype="0" fill="hold" nodeType="clickEffect">
+                                  <p:stCondLst>
+                                    <p:cond delay="0"/>
+                                  </p:stCondLst>
+                                  <p:childTnLst>
+                                    <p:set>
+                                      <p:cBhvr>
+                                        <p:cTn id="21" dur="1" fill="hold">
+                                          <p:stCondLst>
+                                            <p:cond delay="0"/>
+                                          </p:stCondLst>
+                                        </p:cTn>
+                                        <p:tgtEl>
+                                          <p:spTgt spid="3">
+                                            <p:txEl>
+                                              <p:pRg st="3" end="3"/>
+                                            </p:txEl>
+                                          </p:spTgt>
+                                        </p:tgtEl>
+                                        <p:attrNameLst>
+                                          <p:attrName>style.visibility</p:attrName>
+                                        </p:attrNameLst>
+                                      </p:cBhvr>
+                                      <p:to>
+                                        <p:strVal val="visible"/>
+                                      </p:to>
+                                    </p:set>
+                                    <p:animEffect transition="in" filter="fade">
+                                      <p:cBhvr>
+                                        <p:cTn id="22" dur="500"/>
+                                        <p:tgtEl>
+                                          <p:spTgt spid="3">
+                                            <p:txEl>
+                                              <p:pRg st="3" end="3"/>
+                                            </p:txEl>
+                                          </p:spTgt>
+                                        </p:tgtEl>
+                                      </p:cBhvr>
+                                    </p:animEffect>
+                                  </p:childTnLst>
+                                </p:cTn>
+                              </p:par>
+                            </p:childTnLst>
+                          </p:cTn>
+                        </p:par>
+                      </p:childTnLst>
+                    </p:cTn>
+                  </p:par>
+                  <p:par>
+                    <p:cTn id="23" fill="hold">
+                      <p:stCondLst>
+                        <p:cond delay="indefinite"/>
+                      </p:stCondLst>
+                      <p:childTnLst>
+                        <p:par>
+                          <p:cTn id="24" fill="hold">
+                            <p:stCondLst>
+                              <p:cond delay="0"/>
+                            </p:stCondLst>
+                            <p:childTnLst>
+                              <p:par>
+                                <p:cTn id="25" presetID="10" presetClass="entr" presetSubtype="0" fill="hold" nodeType="clickEffect">
+                                  <p:stCondLst>
+                                    <p:cond delay="0"/>
+                                  </p:stCondLst>
+                                  <p:childTnLst>
+                                    <p:set>
+                                      <p:cBhvr>
+                                        <p:cTn id="26" dur="1" fill="hold">
+                                          <p:stCondLst>
+                                            <p:cond delay="0"/>
+                                          </p:stCondLst>
+                                        </p:cTn>
+                                        <p:tgtEl>
+                                          <p:spTgt spid="3">
+                                            <p:txEl>
+                                              <p:pRg st="4" end="4"/>
+                                            </p:txEl>
+                                          </p:spTgt>
+                                        </p:tgtEl>
+                                        <p:attrNameLst>
+                                          <p:attrName>style.visibility</p:attrName>
+                                        </p:attrNameLst>
+                                      </p:cBhvr>
+                                      <p:to>
+                                        <p:strVal val="visible"/>
+                                      </p:to>
+                                    </p:set>
+                                    <p:animEffect transition="in" filter="fade">
+                                      <p:cBhvr>
+                                        <p:cTn id="27" dur="500"/>
+                                        <p:tgtEl>
+                                          <p:spTgt spid="3">
+                                            <p:txEl>
+                                              <p:pRg st="4" end="4"/>
+                                            </p:txEl>
+                                          </p:spTgt>
+                                        </p:tgtEl>
+                                      </p:cBhvr>
+                                    </p:animEffect>
+                                  </p:childTnLst>
+                                </p:cTn>
+                              </p:par>
+                            </p:childTnLst>
+                          </p:cTn>
+                        </p:par>
+                      </p:childTnLst>
+                    </p:cTn>
+                  </p:par>
+                </p:childTnLst>
+              </p:cTn>
+              <p:prevCondLst>
+                <p:cond evt="onPrev" delay="0">
+                  <p:tgtEl>
+                    <p:sldTgt/>
+                  </p:tgtEl>
+                </p:cond>
+              </p:prevCondLst>
+              <p:nextCondLst>
+                <p:cond evt="onNext" delay="0">
+                  <p:tgtEl>
+                    <p:sldTgt/>
+                  </p:tgtEl>
+                </p:cond>
+              </p:nextCondLst>
+            </p:seq>
+          </p:childTnLst>
+        </p:cTn>
       </p:par>
     </p:tnLst>
   </p:timing>
@@ -3322,7 +3702,61 @@
           <a:bodyPr/>
           <a:lstStyle/>
           <a:p>
-            <a:endParaRPr lang="en-US"/>
+            <a:r>
+              <a:rPr lang="en-US" dirty="0"/>
+              <a:t>Explore a </a:t>
+            </a:r>
+            <a:r>
+              <a:rPr lang="en-US" dirty="0" smtClean="0"/>
+              <a:t>randomly generated labyrinth of a mansion</a:t>
+            </a:r>
+          </a:p>
+          <a:p>
+            <a:r>
+              <a:rPr lang="en-US" dirty="0" smtClean="0"/>
+              <a:t>Create a character with stats </a:t>
+            </a:r>
+            <a:r>
+              <a:rPr lang="en-US" dirty="0"/>
+              <a:t>to suit your play style</a:t>
+            </a:r>
+          </a:p>
+          <a:p>
+            <a:r>
+              <a:rPr lang="en-US" dirty="0"/>
+              <a:t>Search the rooms and containers for items and </a:t>
+            </a:r>
+            <a:r>
+              <a:rPr lang="en-US" dirty="0" smtClean="0"/>
+              <a:t>artifacts</a:t>
+            </a:r>
+          </a:p>
+          <a:p>
+            <a:r>
+              <a:rPr lang="en-US" dirty="0" smtClean="0"/>
+              <a:t>Find hidden passages and secrets to help you win</a:t>
+            </a:r>
+            <a:endParaRPr lang="en-US" dirty="0"/>
+          </a:p>
+          <a:p>
+            <a:r>
+              <a:rPr lang="en-US" dirty="0"/>
+              <a:t>Collect special powers from </a:t>
+            </a:r>
+            <a:r>
+              <a:rPr lang="en-US" dirty="0" smtClean="0"/>
+              <a:t>artifacts</a:t>
+            </a:r>
+            <a:endParaRPr lang="en-US" dirty="0"/>
+          </a:p>
+          <a:p>
+            <a:r>
+              <a:rPr lang="en-US" dirty="0"/>
+              <a:t>Survive the Curse’s Awakening OR Destroy the trespassers as a Betrayer.</a:t>
+            </a:r>
+          </a:p>
+          <a:p>
+            <a:endParaRPr lang="en-US" dirty="0"/>
           </a:p>
         </p:txBody>
       </p:sp>
@@ -3339,7 +3773,396 @@
   <p:timing>
     <p:tnLst>
       <p:par>
-        <p:cTn id="1" dur="indefinite" restart="never" nodeType="tmRoot"/>
+        <p:cTn id="1" dur="indefinite" restart="never" nodeType="tmRoot">
+          <p:childTnLst>
+            <p:seq concurrent="1" nextAc="seek">
+              <p:cTn id="2" dur="indefinite" nodeType="mainSeq">
+                <p:childTnLst>
+                  <p:par>
+                    <p:cTn id="3" fill="hold">
+                      <p:stCondLst>
+                        <p:cond delay="indefinite"/>
+                      </p:stCondLst>
+                      <p:childTnLst>
+                        <p:par>
+                          <p:cTn id="4" fill="hold">
+                            <p:stCondLst>
+                              <p:cond delay="0"/>
+                            </p:stCondLst>
+                            <p:childTnLst>
+                              <p:par>
+                                <p:cTn id="5" presetID="10" presetClass="entr" presetSubtype="0" fill="hold" nodeType="clickEffect">
+                                  <p:stCondLst>
+                                    <p:cond delay="0"/>
+                                  </p:stCondLst>
+                                  <p:childTnLst>
+                                    <p:set>
+                                      <p:cBhvr>
+                                        <p:cTn id="6" dur="1" fill="hold">
+                                          <p:stCondLst>
+                                            <p:cond delay="0"/>
+                                          </p:stCondLst>
+                                        </p:cTn>
+                                        <p:tgtEl>
+                                          <p:spTgt spid="3">
+                                            <p:txEl>
+                                              <p:pRg st="0" end="0"/>
+                                            </p:txEl>
+                                          </p:spTgt>
+                                        </p:tgtEl>
+                                        <p:attrNameLst>
+                                          <p:attrName>style.visibility</p:attrName>
+                                        </p:attrNameLst>
+                                      </p:cBhvr>
+                                      <p:to>
+                                        <p:strVal val="visible"/>
+                                      </p:to>
+                                    </p:set>
+                                    <p:animEffect transition="in" filter="fade">
+                                      <p:cBhvr>
+                                        <p:cTn id="7" dur="500"/>
+                                        <p:tgtEl>
+                                          <p:spTgt spid="3">
+                                            <p:txEl>
+                                              <p:pRg st="0" end="0"/>
+                                            </p:txEl>
+                                          </p:spTgt>
+                                        </p:tgtEl>
+                                      </p:cBhvr>
+                                    </p:animEffect>
+                                  </p:childTnLst>
+                                </p:cTn>
+                              </p:par>
+                            </p:childTnLst>
+                          </p:cTn>
+                        </p:par>
+                      </p:childTnLst>
+                    </p:cTn>
+                  </p:par>
+                  <p:par>
+                    <p:cTn id="8" fill="hold">
+                      <p:stCondLst>
+                        <p:cond delay="indefinite"/>
+                      </p:stCondLst>
+                      <p:childTnLst>
+                        <p:par>
+                          <p:cTn id="9" fill="hold">
+                            <p:stCondLst>
+                              <p:cond delay="0"/>
+                            </p:stCondLst>
+                            <p:childTnLst>
+                              <p:par>
+                                <p:cTn id="10" presetID="10" presetClass="entr" presetSubtype="0" fill="hold" nodeType="clickEffect">
+                                  <p:stCondLst>
+                                    <p:cond delay="0"/>
+                                  </p:stCondLst>
+                                  <p:childTnLst>
+                                    <p:set>
+                                      <p:cBhvr>
+                                        <p:cTn id="11" dur="1" fill="hold">
+                                          <p:stCondLst>
+                                            <p:cond delay="0"/>
+                                          </p:stCondLst>
+                                        </p:cTn>
+                                        <p:tgtEl>
+                                          <p:spTgt spid="3">
+                                            <p:txEl>
+                                              <p:pRg st="1" end="1"/>
+                                            </p:txEl>
+                                          </p:spTgt>
+                                        </p:tgtEl>
+                                        <p:attrNameLst>
+                                          <p:attrName>style.visibility</p:attrName>
+                                        </p:attrNameLst>
+                                      </p:cBhvr>
+                                      <p:to>
+                                        <p:strVal val="visible"/>
+                                      </p:to>
+                                    </p:set>
+                                    <p:animEffect transition="in" filter="fade">
+                                      <p:cBhvr>
+                                        <p:cTn id="12" dur="500"/>
+                                        <p:tgtEl>
+                                          <p:spTgt spid="3">
+                                            <p:txEl>
+                                              <p:pRg st="1" end="1"/>
+                                            </p:txEl>
+                                          </p:spTgt>
+                                        </p:tgtEl>
+                                      </p:cBhvr>
+                                    </p:animEffect>
+                                  </p:childTnLst>
+                                </p:cTn>
+                              </p:par>
+                            </p:childTnLst>
+                          </p:cTn>
+                        </p:par>
+                      </p:childTnLst>
+                    </p:cTn>
+                  </p:par>
+                  <p:par>
+                    <p:cTn id="13" fill="hold">
+                      <p:stCondLst>
+                        <p:cond delay="indefinite"/>
+                      </p:stCondLst>
+                      <p:childTnLst>
+                        <p:par>
+                          <p:cTn id="14" fill="hold">
+                            <p:stCondLst>
+                              <p:cond delay="0"/>
+                            </p:stCondLst>
+                            <p:childTnLst>
+                              <p:par>
+                                <p:cTn id="15" presetID="10" presetClass="entr" presetSubtype="0" fill="hold" nodeType="clickEffect">
+                                  <p:stCondLst>
+                                    <p:cond delay="0"/>
+                                  </p:stCondLst>
+                                  <p:childTnLst>
+                                    <p:set>
+                                      <p:cBhvr>
+                                        <p:cTn id="16" dur="1" fill="hold">
+                                          <p:stCondLst>
+                                            <p:cond delay="0"/>
+                                          </p:stCondLst>
+                                        </p:cTn>
+                                        <p:tgtEl>
+                                          <p:spTgt spid="3">
+                                            <p:txEl>
+                                              <p:pRg st="2" end="2"/>
+                                            </p:txEl>
+                                          </p:spTgt>
+                                        </p:tgtEl>
+                                        <p:attrNameLst>
+                                          <p:attrName>style.visibility</p:attrName>
+                                        </p:attrNameLst>
+                                      </p:cBhvr>
+                                      <p:to>
+                                        <p:strVal val="visible"/>
+                                      </p:to>
+                                    </p:set>
+                                    <p:animEffect transition="in" filter="fade">
+                                      <p:cBhvr>
+                                        <p:cTn id="17" dur="500"/>
+                                        <p:tgtEl>
+                                          <p:spTgt spid="3">
+                                            <p:txEl>
+                                              <p:pRg st="2" end="2"/>
+                                            </p:txEl>
+                                          </p:spTgt>
+                                        </p:tgtEl>
+                                      </p:cBhvr>
+                                    </p:animEffect>
+                                  </p:childTnLst>
+                                </p:cTn>
+                              </p:par>
+                            </p:childTnLst>
+                          </p:cTn>
+                        </p:par>
+                      </p:childTnLst>
+                    </p:cTn>
+                  </p:par>
+                  <p:par>
+                    <p:cTn id="18" fill="hold">
+                      <p:stCondLst>
+                        <p:cond delay="indefinite"/>
+                      </p:stCondLst>
+                      <p:childTnLst>
+                        <p:par>
+                          <p:cTn id="19" fill="hold">
+                            <p:stCondLst>
+                              <p:cond delay="0"/>
+                            </p:stCondLst>
+                            <p:childTnLst>
+                              <p:par>
+                                <p:cTn id="20" presetID="10" presetClass="entr" presetSubtype="0" fill="hold" nodeType="clickEffect">
+                                  <p:stCondLst>
+                                    <p:cond delay="0"/>
+                                  </p:stCondLst>
+                                  <p:childTnLst>
+                                    <p:set>
+                                      <p:cBhvr>
+                                        <p:cTn id="21" dur="1" fill="hold">
+                                          <p:stCondLst>
+                                            <p:cond delay="0"/>
+                                          </p:stCondLst>
+                                        </p:cTn>
+                                        <p:tgtEl>
+                                          <p:spTgt spid="3">
+                                            <p:txEl>
+                                              <p:pRg st="3" end="3"/>
+                                            </p:txEl>
+                                          </p:spTgt>
+                                        </p:tgtEl>
+                                        <p:attrNameLst>
+                                          <p:attrName>style.visibility</p:attrName>
+                                        </p:attrNameLst>
+                                      </p:cBhvr>
+                                      <p:to>
+                                        <p:strVal val="visible"/>
+                                      </p:to>
+                                    </p:set>
+                                    <p:animEffect transition="in" filter="fade">
+                                      <p:cBhvr>
+                                        <p:cTn id="22" dur="500"/>
+                                        <p:tgtEl>
+                                          <p:spTgt spid="3">
+                                            <p:txEl>
+                                              <p:pRg st="3" end="3"/>
+                                            </p:txEl>
+                                          </p:spTgt>
+                                        </p:tgtEl>
+                                      </p:cBhvr>
+                                    </p:animEffect>
+                                  </p:childTnLst>
+                                </p:cTn>
+                              </p:par>
+                            </p:childTnLst>
+                          </p:cTn>
+                        </p:par>
+                      </p:childTnLst>
+                    </p:cTn>
+                  </p:par>
+                  <p:par>
+                    <p:cTn id="23" fill="hold">
+                      <p:stCondLst>
+                        <p:cond delay="indefinite"/>
+                      </p:stCondLst>
+                      <p:childTnLst>
+                        <p:par>
+                          <p:cTn id="24" fill="hold">
+                            <p:stCondLst>
+                              <p:cond delay="0"/>
+                            </p:stCondLst>
+                            <p:childTnLst>
+                              <p:par>
+                                <p:cTn id="25" presetID="10" presetClass="entr" presetSubtype="0" fill="hold" nodeType="clickEffect">
+                                  <p:stCondLst>
+                                    <p:cond delay="0"/>
+                                  </p:stCondLst>
+                                  <p:childTnLst>
+                                    <p:set>
+                                      <p:cBhvr>
+                                        <p:cTn id="26" dur="1" fill="hold">
+                                          <p:stCondLst>
+                                            <p:cond delay="0"/>
+                                          </p:stCondLst>
+                                        </p:cTn>
+                                        <p:tgtEl>
+                                          <p:spTgt spid="3">
+                                            <p:txEl>
+                                              <p:pRg st="4" end="4"/>
+                                            </p:txEl>
+                                          </p:spTgt>
+                                        </p:tgtEl>
+                                        <p:attrNameLst>
+                                          <p:attrName>style.visibility</p:attrName>
+                                        </p:attrNameLst>
+                                      </p:cBhvr>
+                                      <p:to>
+                                        <p:strVal val="visible"/>
+                                      </p:to>
+                                    </p:set>
+                                    <p:animEffect transition="in" filter="fade">
+                                      <p:cBhvr>
+                                        <p:cTn id="27" dur="500"/>
+                                        <p:tgtEl>
+                                          <p:spTgt spid="3">
+                                            <p:txEl>
+                                              <p:pRg st="4" end="4"/>
+                                            </p:txEl>
+                                          </p:spTgt>
+                                        </p:tgtEl>
+                                      </p:cBhvr>
+                                    </p:animEffect>
+                                  </p:childTnLst>
+                                </p:cTn>
+                              </p:par>
+                            </p:childTnLst>
+                          </p:cTn>
+                        </p:par>
+                      </p:childTnLst>
+                    </p:cTn>
+                  </p:par>
+                  <p:par>
+                    <p:cTn id="28" fill="hold">
+                      <p:stCondLst>
+                        <p:cond delay="indefinite"/>
+                      </p:stCondLst>
+                      <p:childTnLst>
+                        <p:par>
+                          <p:cTn id="29" fill="hold">
+                            <p:stCondLst>
+                              <p:cond delay="0"/>
+                            </p:stCondLst>
+                            <p:childTnLst>
+                              <p:par>
+                                <p:cTn id="30" presetID="10" presetClass="entr" presetSubtype="0" fill="hold" nodeType="clickEffect">
+                                  <p:stCondLst>
+                                    <p:cond delay="0"/>
+                                  </p:stCondLst>
+                                  <p:childTnLst>
+                                    <p:set>
+                                      <p:cBhvr>
+                                        <p:cTn id="31" dur="1" fill="hold">
+                                          <p:stCondLst>
+                                            <p:cond delay="0"/>
+                                          </p:stCondLst>
+                                        </p:cTn>
+                                        <p:tgtEl>
+                                          <p:spTgt spid="3">
+                                            <p:txEl>
+                                              <p:pRg st="5" end="5"/>
+                                            </p:txEl>
+                                          </p:spTgt>
+                                        </p:tgtEl>
+                                        <p:attrNameLst>
+                                          <p:attrName>style.visibility</p:attrName>
+                                        </p:attrNameLst>
+                                      </p:cBhvr>
+                                      <p:to>
+                                        <p:strVal val="visible"/>
+                                      </p:to>
+                                    </p:set>
+                                    <p:animEffect transition="in" filter="fade">
+                                      <p:cBhvr>
+                                        <p:cTn id="32" dur="500"/>
+                                        <p:tgtEl>
+                                          <p:spTgt spid="3">
+                                            <p:txEl>
+                                              <p:pRg st="5" end="5"/>
+                                            </p:txEl>
+                                          </p:spTgt>
+                                        </p:tgtEl>
+                                      </p:cBhvr>
+                                    </p:animEffect>
+                                  </p:childTnLst>
+                                </p:cTn>
+                              </p:par>
+                            </p:childTnLst>
+                          </p:cTn>
+                        </p:par>
+                      </p:childTnLst>
+                    </p:cTn>
+                  </p:par>
+                </p:childTnLst>
+              </p:cTn>
+              <p:prevCondLst>
+                <p:cond evt="onPrev" delay="0">
+                  <p:tgtEl>
+                    <p:sldTgt/>
+                  </p:tgtEl>
+                </p:cond>
+              </p:prevCondLst>
+              <p:nextCondLst>
+                <p:cond evt="onNext" delay="0">
+                  <p:tgtEl>
+                    <p:sldTgt/>
+                  </p:tgtEl>
+                </p:cond>
+              </p:nextCondLst>
+            </p:seq>
+          </p:childTnLst>
+        </p:cTn>
       </p:par>
     </p:tnLst>
   </p:timing>
@@ -3380,6 +4203,107 @@
           <a:p>
             <a:r>
               <a:rPr lang="en-US" dirty="0" smtClean="0"/>
+              <a:t>Why Are We Different?</a:t>
+            </a:r>
+            <a:endParaRPr lang="en-US" dirty="0"/>
+          </a:p>
+        </p:txBody>
+      </p:sp>
+      <p:sp>
+        <p:nvSpPr>
+          <p:cNvPr id="3" name="Content Placeholder 2"/>
+          <p:cNvSpPr>
+            <a:spLocks noGrp="1"/>
+          </p:cNvSpPr>
+          <p:nvPr>
+            <p:ph idx="1"/>
+          </p:nvPr>
+        </p:nvSpPr>
+        <p:spPr/>
+        <p:txBody>
+          <a:bodyPr/>
+          <a:lstStyle/>
+          <a:p>
+            <a:r>
+              <a:rPr lang="en-US" dirty="0" smtClean="0"/>
+              <a:t>Most horror games are linear and repetitive. Ours is not.</a:t>
+            </a:r>
+          </a:p>
+          <a:p>
+            <a:r>
+              <a:rPr lang="en-US" dirty="0" smtClean="0"/>
+              <a:t>Multiplayer</a:t>
+            </a:r>
+          </a:p>
+          <a:p>
+            <a:r>
+              <a:rPr lang="en-US" dirty="0" smtClean="0"/>
+              <a:t>We are an ambitious group that focuses on quality</a:t>
+            </a:r>
+          </a:p>
+          <a:p>
+            <a:r>
+              <a:rPr lang="en-US" dirty="0" smtClean="0"/>
+              <a:t>Much accomplished in short time already = PROFIT SOONER FOR YOU</a:t>
+            </a:r>
+            <a:endParaRPr lang="en-US" dirty="0"/>
+          </a:p>
+        </p:txBody>
+      </p:sp>
+    </p:spTree>
+    <p:extLst>
+      <p:ext uri="{BB962C8B-B14F-4D97-AF65-F5344CB8AC3E}">
+        <p14:creationId xmlns:p14="http://schemas.microsoft.com/office/powerpoint/2010/main" val="4162882490"/>
+      </p:ext>
+    </p:extLst>
+  </p:cSld>
+  <p:clrMapOvr>
+    <a:masterClrMapping/>
+  </p:clrMapOvr>
+  <p:timing>
+    <p:tnLst>
+      <p:par>
+        <p:cTn id="1" dur="indefinite" restart="never" nodeType="tmRoot"/>
+      </p:par>
+    </p:tnLst>
+  </p:timing>
+</p:sld>
+</file>
+
+<file path=ppt/slides/slide7.xml><?xml version="1.0" encoding="utf-8"?>
+<p:sld xmlns:a="http://schemas.openxmlformats.org/drawingml/2006/main" xmlns:r="http://schemas.openxmlformats.org/officeDocument/2006/relationships" xmlns:p="http://schemas.openxmlformats.org/presentationml/2006/main">
+  <p:cSld>
+    <p:spTree>
+      <p:nvGrpSpPr>
+        <p:cNvPr id="1" name=""/>
+        <p:cNvGrpSpPr/>
+        <p:nvPr/>
+      </p:nvGrpSpPr>
+      <p:grpSpPr>
+        <a:xfrm>
+          <a:off x="0" y="0"/>
+          <a:ext cx="0" cy="0"/>
+          <a:chOff x="0" y="0"/>
+          <a:chExt cx="0" cy="0"/>
+        </a:xfrm>
+      </p:grpSpPr>
+      <p:sp>
+        <p:nvSpPr>
+          <p:cNvPr id="2" name="Title 1"/>
+          <p:cNvSpPr>
+            <a:spLocks noGrp="1"/>
+          </p:cNvSpPr>
+          <p:nvPr>
+            <p:ph type="title"/>
+          </p:nvPr>
+        </p:nvSpPr>
+        <p:spPr/>
+        <p:txBody>
+          <a:bodyPr/>
+          <a:lstStyle/>
+          <a:p>
+            <a:r>
+              <a:rPr lang="en-US" dirty="0" smtClean="0"/>
               <a:t>Demo</a:t>
             </a:r>
             <a:endParaRPr lang="en-US" dirty="0"/>
@@ -3401,7 +4325,7 @@
           <a:bodyPr/>
           <a:lstStyle/>
           <a:p>
-            <a:endParaRPr lang="en-US"/>
+            <a:endParaRPr lang="en-US" dirty="0"/>
           </a:p>
         </p:txBody>
       </p:sp>
@@ -3415,6 +4339,142 @@
   <p:clrMapOvr>
     <a:masterClrMapping/>
   </p:clrMapOvr>
+  <p:timing>
+    <p:tnLst>
+      <p:par>
+        <p:cTn id="1" dur="indefinite" restart="never" nodeType="tmRoot"/>
+      </p:par>
+    </p:tnLst>
+  </p:timing>
+</p:sld>
+</file>
+
+<file path=ppt/slides/slide8.xml><?xml version="1.0" encoding="utf-8"?>
+<p:sld xmlns:a="http://schemas.openxmlformats.org/drawingml/2006/main" xmlns:r="http://schemas.openxmlformats.org/officeDocument/2006/relationships" xmlns:p="http://schemas.openxmlformats.org/presentationml/2006/main">
+  <p:cSld>
+    <p:spTree>
+      <p:nvGrpSpPr>
+        <p:cNvPr id="1" name=""/>
+        <p:cNvGrpSpPr/>
+        <p:nvPr/>
+      </p:nvGrpSpPr>
+      <p:grpSpPr>
+        <a:xfrm>
+          <a:off x="0" y="0"/>
+          <a:ext cx="0" cy="0"/>
+          <a:chOff x="0" y="0"/>
+          <a:chExt cx="0" cy="0"/>
+        </a:xfrm>
+      </p:grpSpPr>
+      <p:sp>
+        <p:nvSpPr>
+          <p:cNvPr id="2" name="Title 1"/>
+          <p:cNvSpPr>
+            <a:spLocks noGrp="1"/>
+          </p:cNvSpPr>
+          <p:nvPr>
+            <p:ph type="title"/>
+          </p:nvPr>
+        </p:nvSpPr>
+        <p:spPr>
+          <a:xfrm>
+            <a:off x="838200" y="2766219"/>
+            <a:ext cx="10515600" cy="1325563"/>
+          </a:xfrm>
+        </p:spPr>
+        <p:txBody>
+          <a:bodyPr>
+            <a:normAutofit/>
+          </a:bodyPr>
+          <a:lstStyle/>
+          <a:p>
+            <a:pPr algn="ctr"/>
+            <a:r>
+              <a:rPr lang="en-US" sz="7200" dirty="0" smtClean="0"/>
+              <a:t>The Creaking Grounds</a:t>
+            </a:r>
+            <a:endParaRPr lang="en-US" sz="7200" dirty="0"/>
+          </a:p>
+        </p:txBody>
+      </p:sp>
+    </p:spTree>
+    <p:extLst>
+      <p:ext uri="{BB962C8B-B14F-4D97-AF65-F5344CB8AC3E}">
+        <p14:creationId xmlns:p14="http://schemas.microsoft.com/office/powerpoint/2010/main" val="2127042176"/>
+      </p:ext>
+    </p:extLst>
+  </p:cSld>
+  <p:clrMapOvr>
+    <a:masterClrMapping/>
+  </p:clrMapOvr>
+  <mc:AlternateContent xmlns:mc="http://schemas.openxmlformats.org/markup-compatibility/2006" xmlns:p14="http://schemas.microsoft.com/office/powerpoint/2010/main">
+    <mc:Choice Requires="p14">
+      <p:transition spd="med" p14:dur="700">
+        <p:fade/>
+      </p:transition>
+    </mc:Choice>
+    <mc:Fallback xmlns="">
+      <p:transition spd="med">
+        <p:fade/>
+      </p:transition>
+    </mc:Fallback>
+  </mc:AlternateContent>
+  <p:timing>
+    <p:tnLst>
+      <p:par>
+        <p:cTn id="1" dur="indefinite" restart="never" nodeType="tmRoot"/>
+      </p:par>
+    </p:tnLst>
+  </p:timing>
+</p:sld>
+</file>
+
+<file path=ppt/slides/slide9.xml><?xml version="1.0" encoding="utf-8"?>
+<p:sld xmlns:a="http://schemas.openxmlformats.org/drawingml/2006/main" xmlns:r="http://schemas.openxmlformats.org/officeDocument/2006/relationships" xmlns:p="http://schemas.openxmlformats.org/presentationml/2006/main">
+  <p:cSld>
+    <p:spTree>
+      <p:nvGrpSpPr>
+        <p:cNvPr id="1" name=""/>
+        <p:cNvGrpSpPr/>
+        <p:nvPr/>
+      </p:nvGrpSpPr>
+      <p:grpSpPr>
+        <a:xfrm>
+          <a:off x="0" y="0"/>
+          <a:ext cx="0" cy="0"/>
+          <a:chOff x="0" y="0"/>
+          <a:chExt cx="0" cy="0"/>
+        </a:xfrm>
+      </p:grpSpPr>
+    </p:spTree>
+    <p:extLst>
+      <p:ext uri="{BB962C8B-B14F-4D97-AF65-F5344CB8AC3E}">
+        <p14:creationId xmlns:p14="http://schemas.microsoft.com/office/powerpoint/2010/main" val="2657612861"/>
+      </p:ext>
+    </p:extLst>
+  </p:cSld>
+  <p:clrMapOvr>
+    <a:masterClrMapping/>
+  </p:clrMapOvr>
+  <mc:AlternateContent xmlns:mc="http://schemas.openxmlformats.org/markup-compatibility/2006">
+    <mc:Choice xmlns:p14="http://schemas.microsoft.com/office/powerpoint/2010/main" Requires="p14">
+      <p:transition spd="med" p14:dur="700">
+        <p:fade/>
+      </p:transition>
+    </mc:Choice>
+    <mc:Fallback>
+      <p:transition spd="med">
+        <p:fade/>
+      </p:transition>
+    </mc:Fallback>
+  </mc:AlternateContent>
+  <p:timing>
+    <p:tnLst>
+      <p:par>
+        <p:cTn id="1" dur="indefinite" restart="never" nodeType="tmRoot"/>
+      </p:par>
+    </p:tnLst>
+  </p:timing>
 </p:sld>
 </file>
 
@@ -3673,7 +4733,7 @@
   <a:extraClrSchemeLst/>
   <a:extLst>
     <a:ext uri="{05A4C25C-085E-4340-85A3-A5531E510DB2}">
-      <thm15:themeFamily xmlns="" xmlns:thm15="http://schemas.microsoft.com/office/thememl/2012/main" name="Office Theme" id="{62F939B6-93AF-4DB8-9C6B-D6C7DFDC589F}" vid="{3E4F19A7-A959-40BB-972C-4880BAF8EB09}"/>
+      <thm15:themeFamily xmlns:thm15="http://schemas.microsoft.com/office/thememl/2012/main" xmlns="" name="Office Theme" id="{62F939B6-93AF-4DB8-9C6B-D6C7DFDC589F}" vid="{3E4F19A7-A959-40BB-972C-4880BAF8EB09}"/>
     </a:ext>
   </a:extLst>
 </a:theme>

</xml_diff>